<commit_message>
Pushing version that was actually given during the TCCC
</commit_message>
<xml_diff>
--- a/on-graceful-decomposition.pptx
+++ b/on-graceful-decomposition.pptx
@@ -5,7 +5,7 @@
     <p:sldMasterId id="2147483792" r:id="rId1"/>
   </p:sldMasterIdLst>
   <p:notesMasterIdLst>
-    <p:notesMasterId r:id="rId22"/>
+    <p:notesMasterId r:id="rId23"/>
   </p:notesMasterIdLst>
   <p:sldIdLst>
     <p:sldId id="256" r:id="rId2"/>
@@ -13,21 +13,22 @@
     <p:sldId id="258" r:id="rId4"/>
     <p:sldId id="259" r:id="rId5"/>
     <p:sldId id="260" r:id="rId6"/>
-    <p:sldId id="261" r:id="rId7"/>
-    <p:sldId id="263" r:id="rId8"/>
-    <p:sldId id="262" r:id="rId9"/>
-    <p:sldId id="273" r:id="rId10"/>
-    <p:sldId id="264" r:id="rId11"/>
-    <p:sldId id="265" r:id="rId12"/>
-    <p:sldId id="266" r:id="rId13"/>
-    <p:sldId id="268" r:id="rId14"/>
-    <p:sldId id="274" r:id="rId15"/>
-    <p:sldId id="269" r:id="rId16"/>
-    <p:sldId id="267" r:id="rId17"/>
-    <p:sldId id="270" r:id="rId18"/>
-    <p:sldId id="271" r:id="rId19"/>
-    <p:sldId id="275" r:id="rId20"/>
-    <p:sldId id="272" r:id="rId21"/>
+    <p:sldId id="276" r:id="rId7"/>
+    <p:sldId id="261" r:id="rId8"/>
+    <p:sldId id="263" r:id="rId9"/>
+    <p:sldId id="262" r:id="rId10"/>
+    <p:sldId id="273" r:id="rId11"/>
+    <p:sldId id="264" r:id="rId12"/>
+    <p:sldId id="265" r:id="rId13"/>
+    <p:sldId id="266" r:id="rId14"/>
+    <p:sldId id="268" r:id="rId15"/>
+    <p:sldId id="274" r:id="rId16"/>
+    <p:sldId id="269" r:id="rId17"/>
+    <p:sldId id="267" r:id="rId18"/>
+    <p:sldId id="270" r:id="rId19"/>
+    <p:sldId id="271" r:id="rId20"/>
+    <p:sldId id="275" r:id="rId21"/>
+    <p:sldId id="272" r:id="rId22"/>
   </p:sldIdLst>
   <p:sldSz cx="12192000" cy="6858000"/>
   <p:notesSz cx="6858000" cy="9144000"/>
@@ -140,6 +141,7 @@
         </p14:section>
         <p14:section name="Defining the target" id="{A0BBBEC4-8E2B-8047-B40B-6741B51E0717}">
           <p14:sldIdLst>
+            <p14:sldId id="276"/>
             <p14:sldId id="261"/>
             <p14:sldId id="263"/>
             <p14:sldId id="262"/>
@@ -27662,7 +27664,7 @@
           <a:p>
             <a:fld id="{0CF584D1-27CB-B042-A472-6DFAFE4A3FB5}" type="slidenum">
               <a:rPr lang="en-US" smtClean="0"/>
-              <a:t>6</a:t>
+              <a:t>7</a:t>
             </a:fld>
             <a:endParaRPr lang="en-US"/>
           </a:p>
@@ -27746,7 +27748,7 @@
           <a:p>
             <a:fld id="{0CF584D1-27CB-B042-A472-6DFAFE4A3FB5}" type="slidenum">
               <a:rPr lang="en-US" smtClean="0"/>
-              <a:t>8</a:t>
+              <a:t>9</a:t>
             </a:fld>
             <a:endParaRPr lang="en-US"/>
           </a:p>
@@ -27830,7 +27832,7 @@
           <a:p>
             <a:fld id="{0CF584D1-27CB-B042-A472-6DFAFE4A3FB5}" type="slidenum">
               <a:rPr lang="en-US" smtClean="0"/>
-              <a:t>11</a:t>
+              <a:t>12</a:t>
             </a:fld>
             <a:endParaRPr lang="en-US"/>
           </a:p>
@@ -27914,7 +27916,7 @@
           <a:p>
             <a:fld id="{0CF584D1-27CB-B042-A472-6DFAFE4A3FB5}" type="slidenum">
               <a:rPr lang="en-US" smtClean="0"/>
-              <a:t>14</a:t>
+              <a:t>15</a:t>
             </a:fld>
             <a:endParaRPr lang="en-US"/>
           </a:p>
@@ -28035,7 +28037,7 @@
           <a:p>
             <a:fld id="{0CF584D1-27CB-B042-A472-6DFAFE4A3FB5}" type="slidenum">
               <a:rPr lang="en-US" smtClean="0"/>
-              <a:t>16</a:t>
+              <a:t>17</a:t>
             </a:fld>
             <a:endParaRPr lang="en-US"/>
           </a:p>
@@ -31690,6 +31692,283 @@
       </p:grpSpPr>
       <p:sp useBgFill="1">
         <p:nvSpPr>
+          <p:cNvPr id="16" name="Rectangle 9">
+            <a:extLst>
+              <a:ext uri="{FF2B5EF4-FFF2-40B4-BE49-F238E27FC236}">
+                <a16:creationId xmlns:a16="http://schemas.microsoft.com/office/drawing/2014/main" id="{A566E947-FB18-4E34-92A1-7AE6603498AE}"/>
+              </a:ext>
+              <a:ext uri="{C183D7F6-B498-43B3-948B-1728B52AA6E4}">
+                <adec:decorative xmlns:adec="http://schemas.microsoft.com/office/drawing/2017/decorative" val="1"/>
+              </a:ext>
+            </a:extLst>
+          </p:cNvPr>
+          <p:cNvSpPr>
+            <a:spLocks noGrp="1" noRot="1" noChangeAspect="1" noMove="1" noResize="1" noEditPoints="1" noAdjustHandles="1" noChangeArrowheads="1" noChangeShapeType="1" noTextEdit="1"/>
+          </p:cNvSpPr>
+          <p:nvPr>
+            <p:extLst>
+              <p:ext uri="{386F3935-93C4-4BCD-93E2-E3B085C9AB24}">
+                <p16:designElem xmlns:p16="http://schemas.microsoft.com/office/powerpoint/2015/main" val="1"/>
+              </p:ext>
+            </p:extLst>
+          </p:nvPr>
+        </p:nvSpPr>
+        <p:spPr>
+          <a:xfrm>
+            <a:off x="0" y="0"/>
+            <a:ext cx="12192000" cy="6858000"/>
+          </a:xfrm>
+          <a:prstGeom prst="rect">
+            <a:avLst/>
+          </a:prstGeom>
+          <a:ln>
+            <a:noFill/>
+          </a:ln>
+        </p:spPr>
+        <p:style>
+          <a:lnRef idx="2">
+            <a:schemeClr val="accent1">
+              <a:shade val="50000"/>
+            </a:schemeClr>
+          </a:lnRef>
+          <a:fillRef idx="1">
+            <a:schemeClr val="accent1"/>
+          </a:fillRef>
+          <a:effectRef idx="0">
+            <a:schemeClr val="accent1"/>
+          </a:effectRef>
+          <a:fontRef idx="minor">
+            <a:schemeClr val="lt1"/>
+          </a:fontRef>
+        </p:style>
+        <p:txBody>
+          <a:bodyPr rtlCol="0" anchor="ctr"/>
+          <a:lstStyle/>
+          <a:p>
+            <a:pPr algn="ctr"/>
+            <a:endParaRPr lang="en-US"/>
+          </a:p>
+        </p:txBody>
+      </p:sp>
+      <p:sp>
+        <p:nvSpPr>
+          <p:cNvPr id="17" name="Rectangle 11">
+            <a:extLst>
+              <a:ext uri="{FF2B5EF4-FFF2-40B4-BE49-F238E27FC236}">
+                <a16:creationId xmlns:a16="http://schemas.microsoft.com/office/drawing/2014/main" id="{7E1FB687-F018-4798-90C8-38F1111E1A6B}"/>
+              </a:ext>
+              <a:ext uri="{C183D7F6-B498-43B3-948B-1728B52AA6E4}">
+                <adec:decorative xmlns:adec="http://schemas.microsoft.com/office/drawing/2017/decorative" val="1"/>
+              </a:ext>
+            </a:extLst>
+          </p:cNvPr>
+          <p:cNvSpPr>
+            <a:spLocks noGrp="1" noRot="1" noChangeAspect="1" noMove="1" noResize="1" noEditPoints="1" noAdjustHandles="1" noChangeArrowheads="1" noChangeShapeType="1" noTextEdit="1"/>
+          </p:cNvSpPr>
+          <p:nvPr>
+            <p:extLst>
+              <p:ext uri="{386F3935-93C4-4BCD-93E2-E3B085C9AB24}">
+                <p16:designElem xmlns:p16="http://schemas.microsoft.com/office/powerpoint/2015/main" val="1"/>
+              </p:ext>
+            </p:extLst>
+          </p:nvPr>
+        </p:nvSpPr>
+        <p:spPr>
+          <a:xfrm rot="5400000">
+            <a:off x="5228428" y="272368"/>
+            <a:ext cx="1741251" cy="11430012"/>
+          </a:xfrm>
+          <a:prstGeom prst="rect">
+            <a:avLst/>
+          </a:prstGeom>
+          <a:solidFill>
+            <a:schemeClr val="accent1"/>
+          </a:solidFill>
+          <a:ln>
+            <a:noFill/>
+          </a:ln>
+        </p:spPr>
+        <p:style>
+          <a:lnRef idx="2">
+            <a:schemeClr val="accent1">
+              <a:shade val="50000"/>
+            </a:schemeClr>
+          </a:lnRef>
+          <a:fillRef idx="1">
+            <a:schemeClr val="accent1"/>
+          </a:fillRef>
+          <a:effectRef idx="0">
+            <a:schemeClr val="accent1"/>
+          </a:effectRef>
+          <a:fontRef idx="minor">
+            <a:schemeClr val="lt1"/>
+          </a:fontRef>
+        </p:style>
+      </p:sp>
+      <p:sp>
+        <p:nvSpPr>
+          <p:cNvPr id="2" name="Title 1">
+            <a:extLst>
+              <a:ext uri="{FF2B5EF4-FFF2-40B4-BE49-F238E27FC236}">
+                <a16:creationId xmlns:a16="http://schemas.microsoft.com/office/drawing/2014/main" id="{C15778AE-1A04-0B4F-A8EB-388B69585F6F}"/>
+              </a:ext>
+            </a:extLst>
+          </p:cNvPr>
+          <p:cNvSpPr>
+            <a:spLocks noGrp="1"/>
+          </p:cNvSpPr>
+          <p:nvPr>
+            <p:ph type="title"/>
+          </p:nvPr>
+        </p:nvSpPr>
+        <p:spPr>
+          <a:xfrm>
+            <a:off x="641667" y="5257630"/>
+            <a:ext cx="10908667" cy="1021405"/>
+          </a:xfrm>
+        </p:spPr>
+        <p:txBody>
+          <a:bodyPr>
+            <a:normAutofit/>
+          </a:bodyPr>
+          <a:lstStyle/>
+          <a:p>
+            <a:pPr algn="ctr"/>
+            <a:r>
+              <a:rPr lang="en-US"/>
+              <a:t>Prioritize Services</a:t>
+            </a:r>
+          </a:p>
+        </p:txBody>
+      </p:sp>
+      <p:sp>
+        <p:nvSpPr>
+          <p:cNvPr id="18" name="Rectangle 13">
+            <a:extLst>
+              <a:ext uri="{FF2B5EF4-FFF2-40B4-BE49-F238E27FC236}">
+                <a16:creationId xmlns:a16="http://schemas.microsoft.com/office/drawing/2014/main" id="{99BAA161-AE24-467D-9AE2-A99E23CD71CD}"/>
+              </a:ext>
+              <a:ext uri="{C183D7F6-B498-43B3-948B-1728B52AA6E4}">
+                <adec:decorative xmlns:adec="http://schemas.microsoft.com/office/drawing/2017/decorative" val="1"/>
+              </a:ext>
+            </a:extLst>
+          </p:cNvPr>
+          <p:cNvSpPr>
+            <a:spLocks noGrp="1" noRot="1" noChangeAspect="1" noMove="1" noResize="1" noEditPoints="1" noAdjustHandles="1" noChangeArrowheads="1" noChangeShapeType="1" noTextEdit="1"/>
+          </p:cNvSpPr>
+          <p:nvPr>
+            <p:extLst>
+              <p:ext uri="{386F3935-93C4-4BCD-93E2-E3B085C9AB24}">
+                <p16:designElem xmlns:p16="http://schemas.microsoft.com/office/powerpoint/2015/main" val="1"/>
+              </p:ext>
+            </p:extLst>
+          </p:nvPr>
+        </p:nvSpPr>
+        <p:spPr>
+          <a:xfrm rot="5400000">
+            <a:off x="5907030" y="-5522982"/>
+            <a:ext cx="384048" cy="11430012"/>
+          </a:xfrm>
+          <a:prstGeom prst="rect">
+            <a:avLst/>
+          </a:prstGeom>
+          <a:solidFill>
+            <a:srgbClr val="C8C8C8">
+              <a:alpha val="49804"/>
+            </a:srgbClr>
+          </a:solidFill>
+          <a:ln>
+            <a:noFill/>
+          </a:ln>
+        </p:spPr>
+        <p:style>
+          <a:lnRef idx="2">
+            <a:schemeClr val="accent1">
+              <a:shade val="50000"/>
+            </a:schemeClr>
+          </a:lnRef>
+          <a:fillRef idx="1">
+            <a:schemeClr val="accent1"/>
+          </a:fillRef>
+          <a:effectRef idx="0">
+            <a:schemeClr val="accent1"/>
+          </a:effectRef>
+          <a:fontRef idx="minor">
+            <a:schemeClr val="lt1"/>
+          </a:fontRef>
+        </p:style>
+      </p:sp>
+      <p:graphicFrame>
+        <p:nvGraphicFramePr>
+          <p:cNvPr id="19" name="Content Placeholder 2">
+            <a:extLst>
+              <a:ext uri="{FF2B5EF4-FFF2-40B4-BE49-F238E27FC236}">
+                <a16:creationId xmlns:a16="http://schemas.microsoft.com/office/drawing/2014/main" id="{11C22C34-9781-4813-9574-F93A005556A3}"/>
+              </a:ext>
+            </a:extLst>
+          </p:cNvPr>
+          <p:cNvGraphicFramePr>
+            <a:graphicFrameLocks noGrp="1"/>
+          </p:cNvGraphicFramePr>
+          <p:nvPr>
+            <p:ph idx="1"/>
+            <p:extLst>
+              <p:ext uri="{D42A27DB-BD31-4B8C-83A1-F6EECF244321}">
+                <p14:modId xmlns:p14="http://schemas.microsoft.com/office/powerpoint/2010/main" val="1985689942"/>
+              </p:ext>
+            </p:extLst>
+          </p:nvPr>
+        </p:nvGraphicFramePr>
+        <p:xfrm>
+          <a:off x="702727" y="1029176"/>
+          <a:ext cx="10786546" cy="3444105"/>
+        </p:xfrm>
+        <a:graphic>
+          <a:graphicData uri="http://schemas.openxmlformats.org/drawingml/2006/diagram">
+            <dgm:relIds xmlns:dgm="http://schemas.openxmlformats.org/drawingml/2006/diagram" xmlns:r="http://schemas.openxmlformats.org/officeDocument/2006/relationships" r:dm="rId2" r:lo="rId3" r:qs="rId4" r:cs="rId5"/>
+          </a:graphicData>
+        </a:graphic>
+      </p:graphicFrame>
+    </p:spTree>
+    <p:extLst>
+      <p:ext uri="{BB962C8B-B14F-4D97-AF65-F5344CB8AC3E}">
+        <p14:creationId xmlns:p14="http://schemas.microsoft.com/office/powerpoint/2010/main" val="2535608765"/>
+      </p:ext>
+    </p:extLst>
+  </p:cSld>
+  <p:clrMapOvr>
+    <a:masterClrMapping/>
+  </p:clrMapOvr>
+</p:sld>
+</file>
+
+<file path=ppt/slides/slide11.xml><?xml version="1.0" encoding="utf-8"?>
+<p:sld xmlns:a="http://schemas.openxmlformats.org/drawingml/2006/main" xmlns:r="http://schemas.openxmlformats.org/officeDocument/2006/relationships" xmlns:p="http://schemas.openxmlformats.org/presentationml/2006/main">
+  <p:cSld>
+    <p:bg>
+      <p:bgPr>
+        <a:solidFill>
+          <a:schemeClr val="bg1"/>
+        </a:solidFill>
+        <a:effectLst/>
+      </p:bgPr>
+    </p:bg>
+    <p:spTree>
+      <p:nvGrpSpPr>
+        <p:cNvPr id="1" name=""/>
+        <p:cNvGrpSpPr/>
+        <p:nvPr/>
+      </p:nvGrpSpPr>
+      <p:grpSpPr>
+        <a:xfrm>
+          <a:off x="0" y="0"/>
+          <a:ext cx="0" cy="0"/>
+          <a:chOff x="0" y="0"/>
+          <a:chExt cx="0" cy="0"/>
+        </a:xfrm>
+      </p:grpSpPr>
+      <p:sp useBgFill="1">
+        <p:nvSpPr>
           <p:cNvPr id="8" name="Rectangle 7">
             <a:extLst>
               <a:ext uri="{FF2B5EF4-FFF2-40B4-BE49-F238E27FC236}">
@@ -32842,7 +33121,7 @@
 </p:sld>
 </file>
 
-<file path=ppt/slides/slide11.xml><?xml version="1.0" encoding="utf-8"?>
+<file path=ppt/slides/slide12.xml><?xml version="1.0" encoding="utf-8"?>
 <p:sld xmlns:a="http://schemas.openxmlformats.org/drawingml/2006/main" xmlns:r="http://schemas.openxmlformats.org/officeDocument/2006/relationships" xmlns:p="http://schemas.openxmlformats.org/presentationml/2006/main">
   <p:cSld>
     <p:bg>
@@ -32935,7 +33214,7 @@
 </p:sld>
 </file>
 
-<file path=ppt/slides/slide12.xml><?xml version="1.0" encoding="utf-8"?>
+<file path=ppt/slides/slide13.xml><?xml version="1.0" encoding="utf-8"?>
 <p:sld xmlns:a="http://schemas.openxmlformats.org/drawingml/2006/main" xmlns:r="http://schemas.openxmlformats.org/officeDocument/2006/relationships" xmlns:p="http://schemas.openxmlformats.org/presentationml/2006/main">
   <p:cSld>
     <p:bg>
@@ -33027,7 +33306,7 @@
 </p:sld>
 </file>
 
-<file path=ppt/slides/slide13.xml><?xml version="1.0" encoding="utf-8"?>
+<file path=ppt/slides/slide14.xml><?xml version="1.0" encoding="utf-8"?>
 <p:sld xmlns:a="http://schemas.openxmlformats.org/drawingml/2006/main" xmlns:r="http://schemas.openxmlformats.org/officeDocument/2006/relationships" xmlns:p="http://schemas.openxmlformats.org/presentationml/2006/main">
   <p:cSld>
     <p:bg>
@@ -33120,7 +33399,7 @@
 </p:sld>
 </file>
 
-<file path=ppt/slides/slide14.xml><?xml version="1.0" encoding="utf-8"?>
+<file path=ppt/slides/slide15.xml><?xml version="1.0" encoding="utf-8"?>
 <p:sld xmlns:a="http://schemas.openxmlformats.org/drawingml/2006/main" xmlns:r="http://schemas.openxmlformats.org/officeDocument/2006/relationships" xmlns:p="http://schemas.openxmlformats.org/presentationml/2006/main">
   <p:cSld>
     <p:spTree>
@@ -33207,7 +33486,7 @@
 </p:sld>
 </file>
 
-<file path=ppt/slides/slide15.xml><?xml version="1.0" encoding="utf-8"?>
+<file path=ppt/slides/slide16.xml><?xml version="1.0" encoding="utf-8"?>
 <p:sld xmlns:a="http://schemas.openxmlformats.org/drawingml/2006/main" xmlns:r="http://schemas.openxmlformats.org/officeDocument/2006/relationships" xmlns:p="http://schemas.openxmlformats.org/presentationml/2006/main">
   <p:cSld>
     <p:bg>
@@ -33299,7 +33578,7 @@
 </p:sld>
 </file>
 
-<file path=ppt/slides/slide16.xml><?xml version="1.0" encoding="utf-8"?>
+<file path=ppt/slides/slide17.xml><?xml version="1.0" encoding="utf-8"?>
 <p:sld xmlns:a="http://schemas.openxmlformats.org/drawingml/2006/main" xmlns:r="http://schemas.openxmlformats.org/officeDocument/2006/relationships" xmlns:p="http://schemas.openxmlformats.org/presentationml/2006/main">
   <p:cSld>
     <p:bg>
@@ -33393,7 +33672,7 @@
 </p:sld>
 </file>
 
-<file path=ppt/slides/slide17.xml><?xml version="1.0" encoding="utf-8"?>
+<file path=ppt/slides/slide18.xml><?xml version="1.0" encoding="utf-8"?>
 <p:sld xmlns:a="http://schemas.openxmlformats.org/drawingml/2006/main" xmlns:r="http://schemas.openxmlformats.org/officeDocument/2006/relationships" xmlns:p="http://schemas.openxmlformats.org/presentationml/2006/main">
   <p:cSld>
     <p:bg>
@@ -33486,7 +33765,7 @@
 </p:sld>
 </file>
 
-<file path=ppt/slides/slide18.xml><?xml version="1.0" encoding="utf-8"?>
+<file path=ppt/slides/slide19.xml><?xml version="1.0" encoding="utf-8"?>
 <p:sld xmlns:a="http://schemas.openxmlformats.org/drawingml/2006/main" xmlns:r="http://schemas.openxmlformats.org/officeDocument/2006/relationships" xmlns:p="http://schemas.openxmlformats.org/presentationml/2006/main">
   <p:cSld>
     <p:spTree>
@@ -33583,98 +33862,6 @@
         </p:txBody>
       </p:sp>
     </p:spTree>
-  </p:cSld>
-  <p:clrMapOvr>
-    <a:masterClrMapping/>
-  </p:clrMapOvr>
-</p:sld>
-</file>
-
-<file path=ppt/slides/slide19.xml><?xml version="1.0" encoding="utf-8"?>
-<p:sld xmlns:a="http://schemas.openxmlformats.org/drawingml/2006/main" xmlns:r="http://schemas.openxmlformats.org/officeDocument/2006/relationships" xmlns:p="http://schemas.openxmlformats.org/presentationml/2006/main">
-  <p:cSld>
-    <p:spTree>
-      <p:nvGrpSpPr>
-        <p:cNvPr id="1" name=""/>
-        <p:cNvGrpSpPr/>
-        <p:nvPr/>
-      </p:nvGrpSpPr>
-      <p:grpSpPr>
-        <a:xfrm>
-          <a:off x="0" y="0"/>
-          <a:ext cx="0" cy="0"/>
-          <a:chOff x="0" y="0"/>
-          <a:chExt cx="0" cy="0"/>
-        </a:xfrm>
-      </p:grpSpPr>
-      <p:sp>
-        <p:nvSpPr>
-          <p:cNvPr id="2" name="Title 1">
-            <a:extLst>
-              <a:ext uri="{FF2B5EF4-FFF2-40B4-BE49-F238E27FC236}">
-                <a16:creationId xmlns:a16="http://schemas.microsoft.com/office/drawing/2014/main" id="{FF95AF00-099C-E248-A617-A7E986422874}"/>
-              </a:ext>
-            </a:extLst>
-          </p:cNvPr>
-          <p:cNvSpPr>
-            <a:spLocks noGrp="1"/>
-          </p:cNvSpPr>
-          <p:nvPr>
-            <p:ph type="title"/>
-          </p:nvPr>
-        </p:nvSpPr>
-        <p:spPr/>
-        <p:txBody>
-          <a:bodyPr/>
-          <a:lstStyle/>
-          <a:p>
-            <a:r>
-              <a:rPr lang="en-US" dirty="0"/>
-              <a:t>Additional Resources</a:t>
-            </a:r>
-          </a:p>
-        </p:txBody>
-      </p:sp>
-      <p:sp>
-        <p:nvSpPr>
-          <p:cNvPr id="3" name="Content Placeholder 2">
-            <a:extLst>
-              <a:ext uri="{FF2B5EF4-FFF2-40B4-BE49-F238E27FC236}">
-                <a16:creationId xmlns:a16="http://schemas.microsoft.com/office/drawing/2014/main" id="{C106C8E4-683B-A644-A4A4-C3E72973AE02}"/>
-              </a:ext>
-            </a:extLst>
-          </p:cNvPr>
-          <p:cNvSpPr>
-            <a:spLocks noGrp="1"/>
-          </p:cNvSpPr>
-          <p:nvPr>
-            <p:ph idx="1"/>
-          </p:nvPr>
-        </p:nvSpPr>
-        <p:spPr/>
-        <p:txBody>
-          <a:bodyPr/>
-          <a:lstStyle/>
-          <a:p>
-            <a:r>
-              <a:rPr lang="en-US" dirty="0"/>
-              <a:t>“Domain Driven Design” by Eric Evans (978-0321125217)</a:t>
-            </a:r>
-          </a:p>
-          <a:p>
-            <a:r>
-              <a:rPr lang="en-US" dirty="0"/>
-              <a:t>“Refactoring” by Martin Fowler (978-0134757599)</a:t>
-            </a:r>
-          </a:p>
-        </p:txBody>
-      </p:sp>
-    </p:spTree>
-    <p:extLst>
-      <p:ext uri="{BB962C8B-B14F-4D97-AF65-F5344CB8AC3E}">
-        <p14:creationId xmlns:p14="http://schemas.microsoft.com/office/powerpoint/2010/main" val="2374715389"/>
-      </p:ext>
-    </p:extLst>
   </p:cSld>
   <p:clrMapOvr>
     <a:masterClrMapping/>
@@ -34024,6 +34211,98 @@
 </file>
 
 <file path=ppt/slides/slide20.xml><?xml version="1.0" encoding="utf-8"?>
+<p:sld xmlns:a="http://schemas.openxmlformats.org/drawingml/2006/main" xmlns:r="http://schemas.openxmlformats.org/officeDocument/2006/relationships" xmlns:p="http://schemas.openxmlformats.org/presentationml/2006/main">
+  <p:cSld>
+    <p:spTree>
+      <p:nvGrpSpPr>
+        <p:cNvPr id="1" name=""/>
+        <p:cNvGrpSpPr/>
+        <p:nvPr/>
+      </p:nvGrpSpPr>
+      <p:grpSpPr>
+        <a:xfrm>
+          <a:off x="0" y="0"/>
+          <a:ext cx="0" cy="0"/>
+          <a:chOff x="0" y="0"/>
+          <a:chExt cx="0" cy="0"/>
+        </a:xfrm>
+      </p:grpSpPr>
+      <p:sp>
+        <p:nvSpPr>
+          <p:cNvPr id="2" name="Title 1">
+            <a:extLst>
+              <a:ext uri="{FF2B5EF4-FFF2-40B4-BE49-F238E27FC236}">
+                <a16:creationId xmlns:a16="http://schemas.microsoft.com/office/drawing/2014/main" id="{FF95AF00-099C-E248-A617-A7E986422874}"/>
+              </a:ext>
+            </a:extLst>
+          </p:cNvPr>
+          <p:cNvSpPr>
+            <a:spLocks noGrp="1"/>
+          </p:cNvSpPr>
+          <p:nvPr>
+            <p:ph type="title"/>
+          </p:nvPr>
+        </p:nvSpPr>
+        <p:spPr/>
+        <p:txBody>
+          <a:bodyPr/>
+          <a:lstStyle/>
+          <a:p>
+            <a:r>
+              <a:rPr lang="en-US" dirty="0"/>
+              <a:t>Additional Resources</a:t>
+            </a:r>
+          </a:p>
+        </p:txBody>
+      </p:sp>
+      <p:sp>
+        <p:nvSpPr>
+          <p:cNvPr id="3" name="Content Placeholder 2">
+            <a:extLst>
+              <a:ext uri="{FF2B5EF4-FFF2-40B4-BE49-F238E27FC236}">
+                <a16:creationId xmlns:a16="http://schemas.microsoft.com/office/drawing/2014/main" id="{C106C8E4-683B-A644-A4A4-C3E72973AE02}"/>
+              </a:ext>
+            </a:extLst>
+          </p:cNvPr>
+          <p:cNvSpPr>
+            <a:spLocks noGrp="1"/>
+          </p:cNvSpPr>
+          <p:nvPr>
+            <p:ph idx="1"/>
+          </p:nvPr>
+        </p:nvSpPr>
+        <p:spPr/>
+        <p:txBody>
+          <a:bodyPr/>
+          <a:lstStyle/>
+          <a:p>
+            <a:r>
+              <a:rPr lang="en-US" dirty="0"/>
+              <a:t>“Domain Driven Design” by Eric Evans (978-0321125217)</a:t>
+            </a:r>
+          </a:p>
+          <a:p>
+            <a:r>
+              <a:rPr lang="en-US" dirty="0"/>
+              <a:t>“Refactoring” by Martin Fowler (978-0134757599)</a:t>
+            </a:r>
+          </a:p>
+        </p:txBody>
+      </p:sp>
+    </p:spTree>
+    <p:extLst>
+      <p:ext uri="{BB962C8B-B14F-4D97-AF65-F5344CB8AC3E}">
+        <p14:creationId xmlns:p14="http://schemas.microsoft.com/office/powerpoint/2010/main" val="2374715389"/>
+      </p:ext>
+    </p:extLst>
+  </p:cSld>
+  <p:clrMapOvr>
+    <a:masterClrMapping/>
+  </p:clrMapOvr>
+</p:sld>
+</file>
+
+<file path=ppt/slides/slide21.xml><?xml version="1.0" encoding="utf-8"?>
 <p:sld xmlns:a="http://schemas.openxmlformats.org/drawingml/2006/main" xmlns:r="http://schemas.openxmlformats.org/officeDocument/2006/relationships" xmlns:p="http://schemas.openxmlformats.org/presentationml/2006/main">
   <p:cSld>
     <p:spTree>
@@ -35158,6 +35437,112 @@
 <file path=ppt/slides/slide6.xml><?xml version="1.0" encoding="utf-8"?>
 <p:sld xmlns:a="http://schemas.openxmlformats.org/drawingml/2006/main" xmlns:r="http://schemas.openxmlformats.org/officeDocument/2006/relationships" xmlns:p="http://schemas.openxmlformats.org/presentationml/2006/main">
   <p:cSld>
+    <p:spTree>
+      <p:nvGrpSpPr>
+        <p:cNvPr id="1" name=""/>
+        <p:cNvGrpSpPr/>
+        <p:nvPr/>
+      </p:nvGrpSpPr>
+      <p:grpSpPr>
+        <a:xfrm>
+          <a:off x="0" y="0"/>
+          <a:ext cx="0" cy="0"/>
+          <a:chOff x="0" y="0"/>
+          <a:chExt cx="0" cy="0"/>
+        </a:xfrm>
+      </p:grpSpPr>
+      <p:sp>
+        <p:nvSpPr>
+          <p:cNvPr id="2" name="Title 1">
+            <a:extLst>
+              <a:ext uri="{FF2B5EF4-FFF2-40B4-BE49-F238E27FC236}">
+                <a16:creationId xmlns:a16="http://schemas.microsoft.com/office/drawing/2014/main" id="{6AB11AB7-938C-1B44-8435-339F04455F0A}"/>
+              </a:ext>
+            </a:extLst>
+          </p:cNvPr>
+          <p:cNvSpPr>
+            <a:spLocks noGrp="1"/>
+          </p:cNvSpPr>
+          <p:nvPr>
+            <p:ph type="title"/>
+          </p:nvPr>
+        </p:nvSpPr>
+        <p:spPr/>
+        <p:txBody>
+          <a:bodyPr/>
+          <a:lstStyle/>
+          <a:p>
+            <a:r>
+              <a:rPr lang="en-US" dirty="0"/>
+              <a:t>Microservice?</a:t>
+            </a:r>
+          </a:p>
+        </p:txBody>
+      </p:sp>
+      <p:sp>
+        <p:nvSpPr>
+          <p:cNvPr id="3" name="Content Placeholder 2">
+            <a:extLst>
+              <a:ext uri="{FF2B5EF4-FFF2-40B4-BE49-F238E27FC236}">
+                <a16:creationId xmlns:a16="http://schemas.microsoft.com/office/drawing/2014/main" id="{779AE0C4-7DC7-1348-9518-A24A74AD2FA6}"/>
+              </a:ext>
+            </a:extLst>
+          </p:cNvPr>
+          <p:cNvSpPr>
+            <a:spLocks noGrp="1"/>
+          </p:cNvSpPr>
+          <p:nvPr>
+            <p:ph idx="1"/>
+          </p:nvPr>
+        </p:nvSpPr>
+        <p:spPr/>
+        <p:txBody>
+          <a:bodyPr/>
+          <a:lstStyle/>
+          <a:p>
+            <a:pPr marL="0" indent="0" fontAlgn="base">
+              <a:buNone/>
+            </a:pPr>
+            <a:r>
+              <a:rPr lang="en-US" i="1" dirty="0"/>
+              <a:t>The term "Microservice Architecture" has sprung up over the last few years to describe a particular way of designing software applications as suites of independently deployable services. While there is no precise definition of this architectural style, there are certain common characteristics around organization around business capability, automated deployment, intelligence in the endpoints, and decentralized control of languages and data.</a:t>
+            </a:r>
+            <a:br>
+              <a:rPr lang="en-US" i="1" dirty="0"/>
+            </a:br>
+            <a:br>
+              <a:rPr lang="en-US" i="1" dirty="0"/>
+            </a:br>
+            <a:r>
+              <a:rPr lang="en-US" sz="1800" i="1" dirty="0"/>
+              <a:t>--</a:t>
+            </a:r>
+            <a:r>
+              <a:rPr lang="en-US" sz="1800" dirty="0">
+                <a:hlinkClick r:id="rId2"/>
+              </a:rPr>
+              <a:t>https://martinfowler.com/articles/microservices.html</a:t>
+            </a:r>
+            <a:endParaRPr lang="en-US" i="1" dirty="0"/>
+          </a:p>
+        </p:txBody>
+      </p:sp>
+    </p:spTree>
+    <p:extLst>
+      <p:ext uri="{BB962C8B-B14F-4D97-AF65-F5344CB8AC3E}">
+        <p14:creationId xmlns:p14="http://schemas.microsoft.com/office/powerpoint/2010/main" val="2367805713"/>
+      </p:ext>
+    </p:extLst>
+  </p:cSld>
+  <p:clrMapOvr>
+    <a:masterClrMapping/>
+  </p:clrMapOvr>
+</p:sld>
+</file>
+
+<file path=ppt/slides/slide7.xml><?xml version="1.0" encoding="utf-8"?>
+<p:sld xmlns:a="http://schemas.openxmlformats.org/drawingml/2006/main" xmlns:r="http://schemas.openxmlformats.org/officeDocument/2006/relationships" xmlns:p="http://schemas.openxmlformats.org/presentationml/2006/main">
+  <p:cSld>
     <p:bg>
       <p:bgPr>
         <a:solidFill>
@@ -35247,7 +35632,7 @@
 </p:sld>
 </file>
 
-<file path=ppt/slides/slide7.xml><?xml version="1.0" encoding="utf-8"?>
+<file path=ppt/slides/slide8.xml><?xml version="1.0" encoding="utf-8"?>
 <p:sld xmlns:a="http://schemas.openxmlformats.org/drawingml/2006/main" xmlns:r="http://schemas.openxmlformats.org/officeDocument/2006/relationships" xmlns:p="http://schemas.openxmlformats.org/presentationml/2006/main">
   <p:cSld>
     <p:bg>
@@ -35519,8 +35904,20 @@
             </a:r>
             <a:r>
               <a:rPr dirty="0"/>
-              <a:t>the domain (your map)</a:t>
+              <a:t>the domain (</a:t>
             </a:r>
+            <a:r>
+              <a:rPr lang="en-US" dirty="0"/>
+              <a:t>orientation</a:t>
+            </a:r>
+            <a:r>
+              <a:rPr lang="en-US"/>
+              <a:t>, landmark</a:t>
+            </a:r>
+            <a:r>
+              <a:t>)</a:t>
+            </a:r>
+            <a:endParaRPr dirty="0"/>
           </a:p>
           <a:p>
             <a:pPr lvl="1"/>
@@ -35604,7 +36001,7 @@
 </p:sld>
 </file>
 
-<file path=ppt/slides/slide8.xml><?xml version="1.0" encoding="utf-8"?>
+<file path=ppt/slides/slide9.xml><?xml version="1.0" encoding="utf-8"?>
 <p:sld xmlns:a="http://schemas.openxmlformats.org/drawingml/2006/main" xmlns:r="http://schemas.openxmlformats.org/officeDocument/2006/relationships" xmlns:p="http://schemas.openxmlformats.org/presentationml/2006/main">
   <p:cSld>
     <p:bg>
@@ -35690,283 +36087,6 @@
         </a:graphic>
       </p:graphicFrame>
     </p:spTree>
-  </p:cSld>
-  <p:clrMapOvr>
-    <a:masterClrMapping/>
-  </p:clrMapOvr>
-</p:sld>
-</file>
-
-<file path=ppt/slides/slide9.xml><?xml version="1.0" encoding="utf-8"?>
-<p:sld xmlns:a="http://schemas.openxmlformats.org/drawingml/2006/main" xmlns:r="http://schemas.openxmlformats.org/officeDocument/2006/relationships" xmlns:p="http://schemas.openxmlformats.org/presentationml/2006/main">
-  <p:cSld>
-    <p:bg>
-      <p:bgPr>
-        <a:solidFill>
-          <a:schemeClr val="bg1"/>
-        </a:solidFill>
-        <a:effectLst/>
-      </p:bgPr>
-    </p:bg>
-    <p:spTree>
-      <p:nvGrpSpPr>
-        <p:cNvPr id="1" name=""/>
-        <p:cNvGrpSpPr/>
-        <p:nvPr/>
-      </p:nvGrpSpPr>
-      <p:grpSpPr>
-        <a:xfrm>
-          <a:off x="0" y="0"/>
-          <a:ext cx="0" cy="0"/>
-          <a:chOff x="0" y="0"/>
-          <a:chExt cx="0" cy="0"/>
-        </a:xfrm>
-      </p:grpSpPr>
-      <p:sp useBgFill="1">
-        <p:nvSpPr>
-          <p:cNvPr id="16" name="Rectangle 9">
-            <a:extLst>
-              <a:ext uri="{FF2B5EF4-FFF2-40B4-BE49-F238E27FC236}">
-                <a16:creationId xmlns:a16="http://schemas.microsoft.com/office/drawing/2014/main" id="{A566E947-FB18-4E34-92A1-7AE6603498AE}"/>
-              </a:ext>
-              <a:ext uri="{C183D7F6-B498-43B3-948B-1728B52AA6E4}">
-                <adec:decorative xmlns:adec="http://schemas.microsoft.com/office/drawing/2017/decorative" val="1"/>
-              </a:ext>
-            </a:extLst>
-          </p:cNvPr>
-          <p:cNvSpPr>
-            <a:spLocks noGrp="1" noRot="1" noChangeAspect="1" noMove="1" noResize="1" noEditPoints="1" noAdjustHandles="1" noChangeArrowheads="1" noChangeShapeType="1" noTextEdit="1"/>
-          </p:cNvSpPr>
-          <p:nvPr>
-            <p:extLst>
-              <p:ext uri="{386F3935-93C4-4BCD-93E2-E3B085C9AB24}">
-                <p16:designElem xmlns:p16="http://schemas.microsoft.com/office/powerpoint/2015/main" val="1"/>
-              </p:ext>
-            </p:extLst>
-          </p:nvPr>
-        </p:nvSpPr>
-        <p:spPr>
-          <a:xfrm>
-            <a:off x="0" y="0"/>
-            <a:ext cx="12192000" cy="6858000"/>
-          </a:xfrm>
-          <a:prstGeom prst="rect">
-            <a:avLst/>
-          </a:prstGeom>
-          <a:ln>
-            <a:noFill/>
-          </a:ln>
-        </p:spPr>
-        <p:style>
-          <a:lnRef idx="2">
-            <a:schemeClr val="accent1">
-              <a:shade val="50000"/>
-            </a:schemeClr>
-          </a:lnRef>
-          <a:fillRef idx="1">
-            <a:schemeClr val="accent1"/>
-          </a:fillRef>
-          <a:effectRef idx="0">
-            <a:schemeClr val="accent1"/>
-          </a:effectRef>
-          <a:fontRef idx="minor">
-            <a:schemeClr val="lt1"/>
-          </a:fontRef>
-        </p:style>
-        <p:txBody>
-          <a:bodyPr rtlCol="0" anchor="ctr"/>
-          <a:lstStyle/>
-          <a:p>
-            <a:pPr algn="ctr"/>
-            <a:endParaRPr lang="en-US"/>
-          </a:p>
-        </p:txBody>
-      </p:sp>
-      <p:sp>
-        <p:nvSpPr>
-          <p:cNvPr id="17" name="Rectangle 11">
-            <a:extLst>
-              <a:ext uri="{FF2B5EF4-FFF2-40B4-BE49-F238E27FC236}">
-                <a16:creationId xmlns:a16="http://schemas.microsoft.com/office/drawing/2014/main" id="{7E1FB687-F018-4798-90C8-38F1111E1A6B}"/>
-              </a:ext>
-              <a:ext uri="{C183D7F6-B498-43B3-948B-1728B52AA6E4}">
-                <adec:decorative xmlns:adec="http://schemas.microsoft.com/office/drawing/2017/decorative" val="1"/>
-              </a:ext>
-            </a:extLst>
-          </p:cNvPr>
-          <p:cNvSpPr>
-            <a:spLocks noGrp="1" noRot="1" noChangeAspect="1" noMove="1" noResize="1" noEditPoints="1" noAdjustHandles="1" noChangeArrowheads="1" noChangeShapeType="1" noTextEdit="1"/>
-          </p:cNvSpPr>
-          <p:nvPr>
-            <p:extLst>
-              <p:ext uri="{386F3935-93C4-4BCD-93E2-E3B085C9AB24}">
-                <p16:designElem xmlns:p16="http://schemas.microsoft.com/office/powerpoint/2015/main" val="1"/>
-              </p:ext>
-            </p:extLst>
-          </p:nvPr>
-        </p:nvSpPr>
-        <p:spPr>
-          <a:xfrm rot="5400000">
-            <a:off x="5228428" y="272368"/>
-            <a:ext cx="1741251" cy="11430012"/>
-          </a:xfrm>
-          <a:prstGeom prst="rect">
-            <a:avLst/>
-          </a:prstGeom>
-          <a:solidFill>
-            <a:schemeClr val="accent1"/>
-          </a:solidFill>
-          <a:ln>
-            <a:noFill/>
-          </a:ln>
-        </p:spPr>
-        <p:style>
-          <a:lnRef idx="2">
-            <a:schemeClr val="accent1">
-              <a:shade val="50000"/>
-            </a:schemeClr>
-          </a:lnRef>
-          <a:fillRef idx="1">
-            <a:schemeClr val="accent1"/>
-          </a:fillRef>
-          <a:effectRef idx="0">
-            <a:schemeClr val="accent1"/>
-          </a:effectRef>
-          <a:fontRef idx="minor">
-            <a:schemeClr val="lt1"/>
-          </a:fontRef>
-        </p:style>
-      </p:sp>
-      <p:sp>
-        <p:nvSpPr>
-          <p:cNvPr id="2" name="Title 1">
-            <a:extLst>
-              <a:ext uri="{FF2B5EF4-FFF2-40B4-BE49-F238E27FC236}">
-                <a16:creationId xmlns:a16="http://schemas.microsoft.com/office/drawing/2014/main" id="{C15778AE-1A04-0B4F-A8EB-388B69585F6F}"/>
-              </a:ext>
-            </a:extLst>
-          </p:cNvPr>
-          <p:cNvSpPr>
-            <a:spLocks noGrp="1"/>
-          </p:cNvSpPr>
-          <p:nvPr>
-            <p:ph type="title"/>
-          </p:nvPr>
-        </p:nvSpPr>
-        <p:spPr>
-          <a:xfrm>
-            <a:off x="641667" y="5257630"/>
-            <a:ext cx="10908667" cy="1021405"/>
-          </a:xfrm>
-        </p:spPr>
-        <p:txBody>
-          <a:bodyPr>
-            <a:normAutofit/>
-          </a:bodyPr>
-          <a:lstStyle/>
-          <a:p>
-            <a:pPr algn="ctr"/>
-            <a:r>
-              <a:rPr lang="en-US"/>
-              <a:t>Prioritize Services</a:t>
-            </a:r>
-          </a:p>
-        </p:txBody>
-      </p:sp>
-      <p:sp>
-        <p:nvSpPr>
-          <p:cNvPr id="18" name="Rectangle 13">
-            <a:extLst>
-              <a:ext uri="{FF2B5EF4-FFF2-40B4-BE49-F238E27FC236}">
-                <a16:creationId xmlns:a16="http://schemas.microsoft.com/office/drawing/2014/main" id="{99BAA161-AE24-467D-9AE2-A99E23CD71CD}"/>
-              </a:ext>
-              <a:ext uri="{C183D7F6-B498-43B3-948B-1728B52AA6E4}">
-                <adec:decorative xmlns:adec="http://schemas.microsoft.com/office/drawing/2017/decorative" val="1"/>
-              </a:ext>
-            </a:extLst>
-          </p:cNvPr>
-          <p:cNvSpPr>
-            <a:spLocks noGrp="1" noRot="1" noChangeAspect="1" noMove="1" noResize="1" noEditPoints="1" noAdjustHandles="1" noChangeArrowheads="1" noChangeShapeType="1" noTextEdit="1"/>
-          </p:cNvSpPr>
-          <p:nvPr>
-            <p:extLst>
-              <p:ext uri="{386F3935-93C4-4BCD-93E2-E3B085C9AB24}">
-                <p16:designElem xmlns:p16="http://schemas.microsoft.com/office/powerpoint/2015/main" val="1"/>
-              </p:ext>
-            </p:extLst>
-          </p:nvPr>
-        </p:nvSpPr>
-        <p:spPr>
-          <a:xfrm rot="5400000">
-            <a:off x="5907030" y="-5522982"/>
-            <a:ext cx="384048" cy="11430012"/>
-          </a:xfrm>
-          <a:prstGeom prst="rect">
-            <a:avLst/>
-          </a:prstGeom>
-          <a:solidFill>
-            <a:srgbClr val="C8C8C8">
-              <a:alpha val="49804"/>
-            </a:srgbClr>
-          </a:solidFill>
-          <a:ln>
-            <a:noFill/>
-          </a:ln>
-        </p:spPr>
-        <p:style>
-          <a:lnRef idx="2">
-            <a:schemeClr val="accent1">
-              <a:shade val="50000"/>
-            </a:schemeClr>
-          </a:lnRef>
-          <a:fillRef idx="1">
-            <a:schemeClr val="accent1"/>
-          </a:fillRef>
-          <a:effectRef idx="0">
-            <a:schemeClr val="accent1"/>
-          </a:effectRef>
-          <a:fontRef idx="minor">
-            <a:schemeClr val="lt1"/>
-          </a:fontRef>
-        </p:style>
-      </p:sp>
-      <p:graphicFrame>
-        <p:nvGraphicFramePr>
-          <p:cNvPr id="19" name="Content Placeholder 2">
-            <a:extLst>
-              <a:ext uri="{FF2B5EF4-FFF2-40B4-BE49-F238E27FC236}">
-                <a16:creationId xmlns:a16="http://schemas.microsoft.com/office/drawing/2014/main" id="{11C22C34-9781-4813-9574-F93A005556A3}"/>
-              </a:ext>
-            </a:extLst>
-          </p:cNvPr>
-          <p:cNvGraphicFramePr>
-            <a:graphicFrameLocks noGrp="1"/>
-          </p:cNvGraphicFramePr>
-          <p:nvPr>
-            <p:ph idx="1"/>
-            <p:extLst>
-              <p:ext uri="{D42A27DB-BD31-4B8C-83A1-F6EECF244321}">
-                <p14:modId xmlns:p14="http://schemas.microsoft.com/office/powerpoint/2010/main" val="1985689942"/>
-              </p:ext>
-            </p:extLst>
-          </p:nvPr>
-        </p:nvGraphicFramePr>
-        <p:xfrm>
-          <a:off x="702727" y="1029176"/>
-          <a:ext cx="10786546" cy="3444105"/>
-        </p:xfrm>
-        <a:graphic>
-          <a:graphicData uri="http://schemas.openxmlformats.org/drawingml/2006/diagram">
-            <dgm:relIds xmlns:dgm="http://schemas.openxmlformats.org/drawingml/2006/diagram" xmlns:r="http://schemas.openxmlformats.org/officeDocument/2006/relationships" r:dm="rId2" r:lo="rId3" r:qs="rId4" r:cs="rId5"/>
-          </a:graphicData>
-        </a:graphic>
-      </p:graphicFrame>
-    </p:spTree>
-    <p:extLst>
-      <p:ext uri="{BB962C8B-B14F-4D97-AF65-F5344CB8AC3E}">
-        <p14:creationId xmlns:p14="http://schemas.microsoft.com/office/powerpoint/2010/main" val="2535608765"/>
-      </p:ext>
-    </p:extLst>
   </p:cSld>
   <p:clrMapOvr>
     <a:masterClrMapping/>

</xml_diff>